<commit_message>
Grammar, equation verification and figure 4 changes in chapter based on LGs comments
</commit_message>
<xml_diff>
--- a/figure/FIGURES.pptx
+++ b/figure/FIGURES.pptx
@@ -199,7 +199,7 @@
           <a:p>
             <a:fld id="{25E4B823-9091-594F-87B2-4D821D50F95B}" type="datetimeFigureOut">
               <a:rPr lang="en-CA" smtClean="0"/>
-              <a:t>2025-04-01</a:t>
+              <a:t>2025-07-15</a:t>
             </a:fld>
             <a:endParaRPr lang="en-CA"/>
           </a:p>
@@ -700,7 +700,7 @@
           <a:p>
             <a:fld id="{3132CF77-6ABA-874C-80E0-4F20B077B08D}" type="datetimeFigureOut">
               <a:rPr lang="en-CA" smtClean="0"/>
-              <a:t>2025-04-01</a:t>
+              <a:t>2025-07-15</a:t>
             </a:fld>
             <a:endParaRPr lang="en-CA"/>
           </a:p>
@@ -900,7 +900,7 @@
           <a:p>
             <a:fld id="{3132CF77-6ABA-874C-80E0-4F20B077B08D}" type="datetimeFigureOut">
               <a:rPr lang="en-CA" smtClean="0"/>
-              <a:t>2025-04-01</a:t>
+              <a:t>2025-07-15</a:t>
             </a:fld>
             <a:endParaRPr lang="en-CA"/>
           </a:p>
@@ -1110,7 +1110,7 @@
           <a:p>
             <a:fld id="{3132CF77-6ABA-874C-80E0-4F20B077B08D}" type="datetimeFigureOut">
               <a:rPr lang="en-CA" smtClean="0"/>
-              <a:t>2025-04-01</a:t>
+              <a:t>2025-07-15</a:t>
             </a:fld>
             <a:endParaRPr lang="en-CA"/>
           </a:p>
@@ -1310,7 +1310,7 @@
           <a:p>
             <a:fld id="{3132CF77-6ABA-874C-80E0-4F20B077B08D}" type="datetimeFigureOut">
               <a:rPr lang="en-CA" smtClean="0"/>
-              <a:t>2025-04-01</a:t>
+              <a:t>2025-07-15</a:t>
             </a:fld>
             <a:endParaRPr lang="en-CA"/>
           </a:p>
@@ -1586,7 +1586,7 @@
           <a:p>
             <a:fld id="{3132CF77-6ABA-874C-80E0-4F20B077B08D}" type="datetimeFigureOut">
               <a:rPr lang="en-CA" smtClean="0"/>
-              <a:t>2025-04-01</a:t>
+              <a:t>2025-07-15</a:t>
             </a:fld>
             <a:endParaRPr lang="en-CA"/>
           </a:p>
@@ -1854,7 +1854,7 @@
           <a:p>
             <a:fld id="{3132CF77-6ABA-874C-80E0-4F20B077B08D}" type="datetimeFigureOut">
               <a:rPr lang="en-CA" smtClean="0"/>
-              <a:t>2025-04-01</a:t>
+              <a:t>2025-07-15</a:t>
             </a:fld>
             <a:endParaRPr lang="en-CA"/>
           </a:p>
@@ -2269,7 +2269,7 @@
           <a:p>
             <a:fld id="{3132CF77-6ABA-874C-80E0-4F20B077B08D}" type="datetimeFigureOut">
               <a:rPr lang="en-CA" smtClean="0"/>
-              <a:t>2025-04-01</a:t>
+              <a:t>2025-07-15</a:t>
             </a:fld>
             <a:endParaRPr lang="en-CA"/>
           </a:p>
@@ -2411,7 +2411,7 @@
           <a:p>
             <a:fld id="{3132CF77-6ABA-874C-80E0-4F20B077B08D}" type="datetimeFigureOut">
               <a:rPr lang="en-CA" smtClean="0"/>
-              <a:t>2025-04-01</a:t>
+              <a:t>2025-07-15</a:t>
             </a:fld>
             <a:endParaRPr lang="en-CA"/>
           </a:p>
@@ -2524,7 +2524,7 @@
           <a:p>
             <a:fld id="{3132CF77-6ABA-874C-80E0-4F20B077B08D}" type="datetimeFigureOut">
               <a:rPr lang="en-CA" smtClean="0"/>
-              <a:t>2025-04-01</a:t>
+              <a:t>2025-07-15</a:t>
             </a:fld>
             <a:endParaRPr lang="en-CA"/>
           </a:p>
@@ -2837,7 +2837,7 @@
           <a:p>
             <a:fld id="{3132CF77-6ABA-874C-80E0-4F20B077B08D}" type="datetimeFigureOut">
               <a:rPr lang="en-CA" smtClean="0"/>
-              <a:t>2025-04-01</a:t>
+              <a:t>2025-07-15</a:t>
             </a:fld>
             <a:endParaRPr lang="en-CA"/>
           </a:p>
@@ -3126,7 +3126,7 @@
           <a:p>
             <a:fld id="{3132CF77-6ABA-874C-80E0-4F20B077B08D}" type="datetimeFigureOut">
               <a:rPr lang="en-CA" smtClean="0"/>
-              <a:t>2025-04-01</a:t>
+              <a:t>2025-07-15</a:t>
             </a:fld>
             <a:endParaRPr lang="en-CA"/>
           </a:p>
@@ -3369,7 +3369,7 @@
           <a:p>
             <a:fld id="{3132CF77-6ABA-874C-80E0-4F20B077B08D}" type="datetimeFigureOut">
               <a:rPr lang="en-CA" smtClean="0"/>
-              <a:t>2025-04-01</a:t>
+              <a:t>2025-07-15</a:t>
             </a:fld>
             <a:endParaRPr lang="en-CA"/>
           </a:p>
@@ -8355,8 +8355,8 @@
           </a:fontRef>
         </p:style>
       </p:cxnSp>
-      <mc:AlternateContent xmlns:mc="http://schemas.openxmlformats.org/markup-compatibility/2006" xmlns:a14="http://schemas.microsoft.com/office/drawing/2010/main">
-        <mc:Choice Requires="a14">
+      <mc:AlternateContent xmlns:mc="http://schemas.openxmlformats.org/markup-compatibility/2006">
+        <mc:Choice xmlns:a14="http://schemas.microsoft.com/office/drawing/2010/main" Requires="a14">
           <p:sp>
             <p:nvSpPr>
               <p:cNvPr id="14" name="TextBox 13">
@@ -8372,7 +8372,7 @@
             <p:spPr>
               <a:xfrm>
                 <a:off x="1380438" y="217786"/>
-                <a:ext cx="1745221" cy="276999"/>
+                <a:ext cx="1766189" cy="276999"/>
               </a:xfrm>
               <a:prstGeom prst="rect">
                 <a:avLst/>
@@ -8409,13 +8409,34 @@
                             </m:ctrlPr>
                           </m:dPr>
                           <m:e>
-                            <m:r>
-                              <a:rPr lang="en-CA" i="1" smtClean="0">
-                                <a:latin typeface="Cambria Math" panose="02040503050406030204" pitchFamily="18" charset="0"/>
-                                <a:ea typeface="Cambria Math" panose="02040503050406030204" pitchFamily="18" charset="0"/>
-                              </a:rPr>
-                              <m:t>𝜓</m:t>
-                            </m:r>
+                            <m:sSub>
+                              <m:sSubPr>
+                                <m:ctrlPr>
+                                  <a:rPr lang="en-CA" i="1" smtClean="0">
+                                    <a:latin typeface="Cambria Math" panose="02040503050406030204" pitchFamily="18" charset="0"/>
+                                    <a:ea typeface="Cambria Math" panose="02040503050406030204" pitchFamily="18" charset="0"/>
+                                  </a:rPr>
+                                </m:ctrlPr>
+                              </m:sSubPr>
+                              <m:e>
+                                <m:r>
+                                  <a:rPr lang="en-CA" i="1" smtClean="0">
+                                    <a:latin typeface="Cambria Math" panose="02040503050406030204" pitchFamily="18" charset="0"/>
+                                    <a:ea typeface="Cambria Math" panose="02040503050406030204" pitchFamily="18" charset="0"/>
+                                  </a:rPr>
+                                  <m:t>𝜓</m:t>
+                                </m:r>
+                              </m:e>
+                              <m:sub>
+                                <m:r>
+                                  <a:rPr lang="fr-FR" b="0" i="1" smtClean="0">
+                                    <a:latin typeface="Cambria Math" panose="02040503050406030204" pitchFamily="18" charset="0"/>
+                                    <a:ea typeface="Cambria Math" panose="02040503050406030204" pitchFamily="18" charset="0"/>
+                                  </a:rPr>
+                                  <m:t>𝑖</m:t>
+                                </m:r>
+                              </m:sub>
+                            </m:sSub>
                           </m:e>
                         </m:d>
                       </m:e>
@@ -8511,7 +8532,7 @@
             </p:txBody>
           </p:sp>
         </mc:Choice>
-        <mc:Fallback xmlns="">
+        <mc:Fallback>
           <p:sp>
             <p:nvSpPr>
               <p:cNvPr id="14" name="TextBox 13">
@@ -8529,15 +8550,15 @@
             <p:spPr>
               <a:xfrm>
                 <a:off x="1380438" y="217786"/>
-                <a:ext cx="1745221" cy="276999"/>
+                <a:ext cx="1766189" cy="276999"/>
               </a:xfrm>
               <a:prstGeom prst="rect">
                 <a:avLst/>
               </a:prstGeom>
               <a:blipFill>
-                <a:blip r:embed="rId8"/>
+                <a:blip r:embed="rId4"/>
                 <a:stretch>
-                  <a:fillRect l="-23022" t="-168182" r="-14388" b="-245455"/>
+                  <a:fillRect l="-22857" t="-168182" r="-17857" b="-245455"/>
                 </a:stretch>
               </a:blipFill>
             </p:spPr>
@@ -9199,8 +9220,8 @@
           </a:fontRef>
         </p:style>
       </p:cxnSp>
-      <mc:AlternateContent xmlns:mc="http://schemas.openxmlformats.org/markup-compatibility/2006">
-        <mc:Choice xmlns:a14="http://schemas.microsoft.com/office/drawing/2010/main" Requires="a14">
+      <mc:AlternateContent xmlns:mc="http://schemas.openxmlformats.org/markup-compatibility/2006" xmlns:a14="http://schemas.microsoft.com/office/drawing/2010/main">
+        <mc:Choice Requires="a14">
           <p:sp>
             <p:nvSpPr>
               <p:cNvPr id="30" name="TextBox 29">
@@ -9251,7 +9272,7 @@
             </p:txBody>
           </p:sp>
         </mc:Choice>
-        <mc:Fallback>
+        <mc:Fallback xmlns="">
           <p:sp>
             <p:nvSpPr>
               <p:cNvPr id="30" name="TextBox 29">
@@ -9757,8 +9778,257 @@
             </p:nvSpPr>
             <p:spPr>
               <a:xfrm>
-                <a:off x="9670768" y="488607"/>
-                <a:ext cx="516925" cy="369332"/>
+                <a:off x="9930760" y="4300492"/>
+                <a:ext cx="1532509" cy="411331"/>
+              </a:xfrm>
+              <a:prstGeom prst="rect">
+                <a:avLst/>
+              </a:prstGeom>
+              <a:noFill/>
+            </p:spPr>
+            <p:txBody>
+              <a:bodyPr wrap="square">
+                <a:spAutoFit/>
+              </a:bodyPr>
+              <a:lstStyle/>
+              <a:p>
+                <a:pPr/>
+                <a14:m>
+                  <m:oMath xmlns:m="http://schemas.openxmlformats.org/officeDocument/2006/math">
+                    <m:d>
+                      <m:dPr>
+                        <m:begChr m:val="|"/>
+                        <m:endChr m:val=""/>
+                        <m:ctrlPr>
+                          <a:rPr lang="en-CA" i="1" smtClean="0">
+                            <a:latin typeface="Cambria Math" panose="02040503050406030204" pitchFamily="18" charset="0"/>
+                            <a:ea typeface="Cambria Math" panose="02040503050406030204" pitchFamily="18" charset="0"/>
+                          </a:rPr>
+                        </m:ctrlPr>
+                      </m:dPr>
+                      <m:e>
+                        <m:d>
+                          <m:dPr>
+                            <m:begChr m:val=""/>
+                            <m:endChr m:val="⟩"/>
+                            <m:ctrlPr>
+                              <a:rPr lang="en-CA" i="1" smtClean="0">
+                                <a:latin typeface="Cambria Math" panose="02040503050406030204" pitchFamily="18" charset="0"/>
+                                <a:ea typeface="Cambria Math" panose="02040503050406030204" pitchFamily="18" charset="0"/>
+                              </a:rPr>
+                            </m:ctrlPr>
+                          </m:dPr>
+                          <m:e>
+                            <m:sSub>
+                              <m:sSubPr>
+                                <m:ctrlPr>
+                                  <a:rPr lang="en-CA" i="1" smtClean="0">
+                                    <a:latin typeface="Cambria Math" panose="02040503050406030204" pitchFamily="18" charset="0"/>
+                                    <a:ea typeface="Cambria Math" panose="02040503050406030204" pitchFamily="18" charset="0"/>
+                                  </a:rPr>
+                                </m:ctrlPr>
+                              </m:sSubPr>
+                              <m:e>
+                                <m:r>
+                                  <a:rPr lang="en-CA" i="1" smtClean="0">
+                                    <a:latin typeface="Cambria Math" panose="02040503050406030204" pitchFamily="18" charset="0"/>
+                                    <a:ea typeface="Cambria Math" panose="02040503050406030204" pitchFamily="18" charset="0"/>
+                                  </a:rPr>
+                                  <m:t>𝜓</m:t>
+                                </m:r>
+                              </m:e>
+                              <m:sub>
+                                <m:r>
+                                  <a:rPr lang="fr-FR" b="0" i="1" smtClean="0">
+                                    <a:latin typeface="Cambria Math" panose="02040503050406030204" pitchFamily="18" charset="0"/>
+                                    <a:ea typeface="Cambria Math" panose="02040503050406030204" pitchFamily="18" charset="0"/>
+                                  </a:rPr>
+                                  <m:t>𝑓</m:t>
+                                </m:r>
+                              </m:sub>
+                            </m:sSub>
+                          </m:e>
+                        </m:d>
+                      </m:e>
+                    </m:d>
+                  </m:oMath>
+                </a14:m>
+                <a:r>
+                  <a:rPr lang="en-CA" dirty="0">
+                    <a:ea typeface="Cambria Math" panose="02040503050406030204" pitchFamily="18" charset="0"/>
+                  </a:rPr>
+                  <a:t> </a:t>
+                </a:r>
+                <a14:m>
+                  <m:oMath xmlns:m="http://schemas.openxmlformats.org/officeDocument/2006/math">
+                    <m:r>
+                      <a:rPr lang="en-CA" i="1" smtClean="0">
+                        <a:latin typeface="Cambria Math" panose="02040503050406030204" pitchFamily="18" charset="0"/>
+                        <a:ea typeface="Cambria Math" panose="02040503050406030204" pitchFamily="18" charset="0"/>
+                      </a:rPr>
+                      <m:t>≈</m:t>
+                    </m:r>
+                    <m:d>
+                      <m:dPr>
+                        <m:begChr m:val="|"/>
+                        <m:endChr m:val=""/>
+                        <m:ctrlPr>
+                          <a:rPr lang="en-CA" i="1">
+                            <a:latin typeface="Cambria Math" panose="02040503050406030204" pitchFamily="18" charset="0"/>
+                            <a:ea typeface="Cambria Math" panose="02040503050406030204" pitchFamily="18" charset="0"/>
+                          </a:rPr>
+                        </m:ctrlPr>
+                      </m:dPr>
+                      <m:e>
+                        <m:d>
+                          <m:dPr>
+                            <m:begChr m:val=""/>
+                            <m:endChr m:val="⟩"/>
+                            <m:ctrlPr>
+                              <a:rPr lang="en-CA" i="1">
+                                <a:latin typeface="Cambria Math" panose="02040503050406030204" pitchFamily="18" charset="0"/>
+                                <a:ea typeface="Cambria Math" panose="02040503050406030204" pitchFamily="18" charset="0"/>
+                              </a:rPr>
+                            </m:ctrlPr>
+                          </m:dPr>
+                          <m:e>
+                            <m:sSub>
+                              <m:sSubPr>
+                                <m:ctrlPr>
+                                  <a:rPr lang="en-CA" i="1">
+                                    <a:latin typeface="Cambria Math" panose="02040503050406030204" pitchFamily="18" charset="0"/>
+                                    <a:ea typeface="Cambria Math" panose="02040503050406030204" pitchFamily="18" charset="0"/>
+                                  </a:rPr>
+                                </m:ctrlPr>
+                              </m:sSubPr>
+                              <m:e>
+                                <m:r>
+                                  <a:rPr lang="en-CA" i="1">
+                                    <a:latin typeface="Cambria Math" panose="02040503050406030204" pitchFamily="18" charset="0"/>
+                                    <a:ea typeface="Cambria Math" panose="02040503050406030204" pitchFamily="18" charset="0"/>
+                                  </a:rPr>
+                                  <m:t>𝜓</m:t>
+                                </m:r>
+                              </m:e>
+                              <m:sub>
+                                <m:r>
+                                  <a:rPr lang="fr-FR" b="0" i="1" smtClean="0">
+                                    <a:latin typeface="Cambria Math" panose="02040503050406030204" pitchFamily="18" charset="0"/>
+                                    <a:ea typeface="Cambria Math" panose="02040503050406030204" pitchFamily="18" charset="0"/>
+                                  </a:rPr>
+                                  <m:t>𝑖</m:t>
+                                </m:r>
+                              </m:sub>
+                            </m:sSub>
+                          </m:e>
+                        </m:d>
+                      </m:e>
+                    </m:d>
+                  </m:oMath>
+                </a14:m>
+                <a:endParaRPr lang="en-CA" dirty="0"/>
+              </a:p>
+            </p:txBody>
+          </p:sp>
+        </mc:Choice>
+        <mc:Fallback>
+          <p:sp>
+            <p:nvSpPr>
+              <p:cNvPr id="3" name="TextBox 2">
+                <a:extLst>
+                  <a:ext uri="{FF2B5EF4-FFF2-40B4-BE49-F238E27FC236}">
+                    <a16:creationId xmlns:a16="http://schemas.microsoft.com/office/drawing/2014/main" id="{73C6A65E-DECE-73AB-E3CB-B408781CCE4A}"/>
+                  </a:ext>
+                </a:extLst>
+              </p:cNvPr>
+              <p:cNvSpPr txBox="1">
+                <a:spLocks noRot="1" noChangeAspect="1" noMove="1" noResize="1" noEditPoints="1" noAdjustHandles="1" noChangeArrowheads="1" noChangeShapeType="1" noTextEdit="1"/>
+              </p:cNvSpPr>
+              <p:nvPr/>
+            </p:nvSpPr>
+            <p:spPr>
+              <a:xfrm>
+                <a:off x="9930760" y="4300492"/>
+                <a:ext cx="1532509" cy="411331"/>
+              </a:xfrm>
+              <a:prstGeom prst="rect">
+                <a:avLst/>
+              </a:prstGeom>
+              <a:blipFill>
+                <a:blip r:embed="rId22"/>
+                <a:stretch>
+                  <a:fillRect l="-30328" t="-144118" b="-214706"/>
+                </a:stretch>
+              </a:blipFill>
+            </p:spPr>
+            <p:txBody>
+              <a:bodyPr/>
+              <a:lstStyle/>
+              <a:p>
+                <a:r>
+                  <a:rPr lang="en-CA">
+                    <a:noFill/>
+                  </a:rPr>
+                  <a:t> </a:t>
+                </a:r>
+              </a:p>
+            </p:txBody>
+          </p:sp>
+        </mc:Fallback>
+      </mc:AlternateContent>
+      <p:pic>
+        <p:nvPicPr>
+          <p:cNvPr id="25" name="Graphic 24" descr="Normal Distribution outline">
+            <a:extLst>
+              <a:ext uri="{FF2B5EF4-FFF2-40B4-BE49-F238E27FC236}">
+                <a16:creationId xmlns:a16="http://schemas.microsoft.com/office/drawing/2014/main" id="{48D84B23-FD83-62B1-7AF8-D479E5005D7A}"/>
+              </a:ext>
+            </a:extLst>
+          </p:cNvPr>
+          <p:cNvPicPr>
+            <a:picLocks noChangeAspect="1"/>
+          </p:cNvPicPr>
+          <p:nvPr/>
+        </p:nvPicPr>
+        <p:blipFill>
+          <a:blip r:embed="rId18">
+            <a:extLst>
+              <a:ext uri="{96DAC541-7B7A-43D3-8B79-37D633B846F1}">
+                <asvg:svgBlip xmlns:asvg="http://schemas.microsoft.com/office/drawing/2016/SVG/main" r:embed="rId19"/>
+              </a:ext>
+            </a:extLst>
+          </a:blip>
+          <a:srcRect l="21347" b="18590"/>
+          <a:stretch/>
+        </p:blipFill>
+        <p:spPr>
+          <a:xfrm>
+            <a:off x="8776254" y="13977"/>
+            <a:ext cx="2989805" cy="3094582"/>
+          </a:xfrm>
+          <a:prstGeom prst="rect">
+            <a:avLst/>
+          </a:prstGeom>
+        </p:spPr>
+      </p:pic>
+      <mc:AlternateContent xmlns:mc="http://schemas.openxmlformats.org/markup-compatibility/2006">
+        <mc:Choice xmlns:a14="http://schemas.microsoft.com/office/drawing/2010/main" Requires="a14">
+          <p:sp>
+            <p:nvSpPr>
+              <p:cNvPr id="6" name="TextBox 5">
+                <a:extLst>
+                  <a:ext uri="{FF2B5EF4-FFF2-40B4-BE49-F238E27FC236}">
+                    <a16:creationId xmlns:a16="http://schemas.microsoft.com/office/drawing/2014/main" id="{DB706376-8363-D225-0212-ABFB1556259D}"/>
+                  </a:ext>
+                </a:extLst>
+              </p:cNvPr>
+              <p:cNvSpPr txBox="1"/>
+              <p:nvPr/>
+            </p:nvSpPr>
+            <p:spPr>
+              <a:xfrm>
+                <a:off x="1668444" y="3575860"/>
+                <a:ext cx="1155855" cy="369332"/>
               </a:xfrm>
               <a:prstGeom prst="rect">
                 <a:avLst/>
@@ -9785,6 +10055,7 @@
                           <m:ctrlPr>
                             <a:rPr lang="en-CA" i="1" smtClean="0">
                               <a:latin typeface="Cambria Math" panose="02040503050406030204" pitchFamily="18" charset="0"/>
+                              <a:ea typeface="Cambria Math" panose="02040503050406030204" pitchFamily="18" charset="0"/>
                             </a:rPr>
                           </m:ctrlPr>
                         </m:dPr>
@@ -9796,17 +10067,39 @@
                               <m:ctrlPr>
                                 <a:rPr lang="en-CA" i="1" smtClean="0">
                                   <a:latin typeface="Cambria Math" panose="02040503050406030204" pitchFamily="18" charset="0"/>
+                                  <a:ea typeface="Cambria Math" panose="02040503050406030204" pitchFamily="18" charset="0"/>
                                 </a:rPr>
                               </m:ctrlPr>
                             </m:dPr>
                             <m:e>
-                              <m:r>
-                                <a:rPr lang="en-CA" i="1" smtClean="0">
-                                  <a:latin typeface="Cambria Math" panose="02040503050406030204" pitchFamily="18" charset="0"/>
-                                  <a:ea typeface="Cambria Math" panose="02040503050406030204" pitchFamily="18" charset="0"/>
-                                </a:rPr>
-                                <m:t>𝜓</m:t>
-                              </m:r>
+                              <m:sSub>
+                                <m:sSubPr>
+                                  <m:ctrlPr>
+                                    <a:rPr lang="en-CA" i="1" smtClean="0">
+                                      <a:latin typeface="Cambria Math" panose="02040503050406030204" pitchFamily="18" charset="0"/>
+                                      <a:ea typeface="Cambria Math" panose="02040503050406030204" pitchFamily="18" charset="0"/>
+                                    </a:rPr>
+                                  </m:ctrlPr>
+                                </m:sSubPr>
+                                <m:e>
+                                  <m:r>
+                                    <a:rPr lang="en-CA" i="1" smtClean="0">
+                                      <a:latin typeface="Cambria Math" panose="02040503050406030204" pitchFamily="18" charset="0"/>
+                                      <a:ea typeface="Cambria Math" panose="02040503050406030204" pitchFamily="18" charset="0"/>
+                                    </a:rPr>
+                                    <m:t>𝜓</m:t>
+                                  </m:r>
+                                </m:e>
+                                <m:sub>
+                                  <m:r>
+                                    <a:rPr lang="fr-FR" b="0" i="1" smtClean="0">
+                                      <a:latin typeface="Cambria Math" panose="02040503050406030204" pitchFamily="18" charset="0"/>
+                                      <a:ea typeface="Cambria Math" panose="02040503050406030204" pitchFamily="18" charset="0"/>
+                                    </a:rPr>
+                                    <m:t>𝑖</m:t>
+                                  </m:r>
+                                </m:sub>
+                              </m:sSub>
                             </m:e>
                           </m:d>
                         </m:e>
@@ -9822,10 +10115,10 @@
         <mc:Fallback>
           <p:sp>
             <p:nvSpPr>
-              <p:cNvPr id="3" name="TextBox 2">
+              <p:cNvPr id="6" name="TextBox 5">
                 <a:extLst>
                   <a:ext uri="{FF2B5EF4-FFF2-40B4-BE49-F238E27FC236}">
-                    <a16:creationId xmlns:a16="http://schemas.microsoft.com/office/drawing/2014/main" id="{73C6A65E-DECE-73AB-E3CB-B408781CCE4A}"/>
+                    <a16:creationId xmlns:a16="http://schemas.microsoft.com/office/drawing/2014/main" id="{DB706376-8363-D225-0212-ABFB1556259D}"/>
                   </a:ext>
                 </a:extLst>
               </p:cNvPr>
@@ -9836,16 +10129,16 @@
             </p:nvSpPr>
             <p:spPr>
               <a:xfrm>
-                <a:off x="9670768" y="488607"/>
-                <a:ext cx="516925" cy="369332"/>
+                <a:off x="1668444" y="3575860"/>
+                <a:ext cx="1155855" cy="369332"/>
               </a:xfrm>
               <a:prstGeom prst="rect">
                 <a:avLst/>
               </a:prstGeom>
               <a:blipFill>
-                <a:blip r:embed="rId22"/>
+                <a:blip r:embed="rId23"/>
                 <a:stretch>
-                  <a:fillRect l="-59524" t="-110000" r="-42857" b="-166667"/>
+                  <a:fillRect l="-2174" t="-110000" b="-166667"/>
                 </a:stretch>
               </a:blipFill>
             </p:spPr>
@@ -9864,41 +10157,6 @@
           </p:sp>
         </mc:Fallback>
       </mc:AlternateContent>
-      <p:pic>
-        <p:nvPicPr>
-          <p:cNvPr id="25" name="Graphic 24" descr="Normal Distribution outline">
-            <a:extLst>
-              <a:ext uri="{FF2B5EF4-FFF2-40B4-BE49-F238E27FC236}">
-                <a16:creationId xmlns:a16="http://schemas.microsoft.com/office/drawing/2014/main" id="{48D84B23-FD83-62B1-7AF8-D479E5005D7A}"/>
-              </a:ext>
-            </a:extLst>
-          </p:cNvPr>
-          <p:cNvPicPr>
-            <a:picLocks noChangeAspect="1"/>
-          </p:cNvPicPr>
-          <p:nvPr/>
-        </p:nvPicPr>
-        <p:blipFill>
-          <a:blip r:embed="rId18">
-            <a:extLst>
-              <a:ext uri="{96DAC541-7B7A-43D3-8B79-37D633B846F1}">
-                <asvg:svgBlip xmlns:asvg="http://schemas.microsoft.com/office/drawing/2016/SVG/main" r:embed="rId19"/>
-              </a:ext>
-            </a:extLst>
-          </a:blip>
-          <a:srcRect l="21347" b="18590"/>
-          <a:stretch/>
-        </p:blipFill>
-        <p:spPr>
-          <a:xfrm>
-            <a:off x="8776254" y="13977"/>
-            <a:ext cx="2989805" cy="3094582"/>
-          </a:xfrm>
-          <a:prstGeom prst="rect">
-            <a:avLst/>
-          </a:prstGeom>
-        </p:spPr>
-      </p:pic>
     </p:spTree>
     <p:extLst>
       <p:ext uri="{BB962C8B-B14F-4D97-AF65-F5344CB8AC3E}">

</xml_diff>

<commit_message>
Created new date for the thesis, and changed abstract and sommaire to be more clear along with adding the goal to be verifying different degrees of freedom for weak measurement implimentation and did the same to chapter 1. Also changed figures in chapter 3 for both speed of signal results along with some paragraphs describing the results. Added python code that creates the visibility theory plot in section 4.2.
</commit_message>
<xml_diff>
--- a/figure/FIGURES.pptx
+++ b/figure/FIGURES.pptx
@@ -199,7 +199,7 @@
           <a:p>
             <a:fld id="{25E4B823-9091-594F-87B2-4D821D50F95B}" type="datetimeFigureOut">
               <a:rPr lang="en-CA" smtClean="0"/>
-              <a:t>2025-07-15</a:t>
+              <a:t>2025-07-25</a:t>
             </a:fld>
             <a:endParaRPr lang="en-CA"/>
           </a:p>
@@ -700,7 +700,7 @@
           <a:p>
             <a:fld id="{3132CF77-6ABA-874C-80E0-4F20B077B08D}" type="datetimeFigureOut">
               <a:rPr lang="en-CA" smtClean="0"/>
-              <a:t>2025-07-15</a:t>
+              <a:t>2025-07-25</a:t>
             </a:fld>
             <a:endParaRPr lang="en-CA"/>
           </a:p>
@@ -900,7 +900,7 @@
           <a:p>
             <a:fld id="{3132CF77-6ABA-874C-80E0-4F20B077B08D}" type="datetimeFigureOut">
               <a:rPr lang="en-CA" smtClean="0"/>
-              <a:t>2025-07-15</a:t>
+              <a:t>2025-07-25</a:t>
             </a:fld>
             <a:endParaRPr lang="en-CA"/>
           </a:p>
@@ -1110,7 +1110,7 @@
           <a:p>
             <a:fld id="{3132CF77-6ABA-874C-80E0-4F20B077B08D}" type="datetimeFigureOut">
               <a:rPr lang="en-CA" smtClean="0"/>
-              <a:t>2025-07-15</a:t>
+              <a:t>2025-07-25</a:t>
             </a:fld>
             <a:endParaRPr lang="en-CA"/>
           </a:p>
@@ -1310,7 +1310,7 @@
           <a:p>
             <a:fld id="{3132CF77-6ABA-874C-80E0-4F20B077B08D}" type="datetimeFigureOut">
               <a:rPr lang="en-CA" smtClean="0"/>
-              <a:t>2025-07-15</a:t>
+              <a:t>2025-07-25</a:t>
             </a:fld>
             <a:endParaRPr lang="en-CA"/>
           </a:p>
@@ -1586,7 +1586,7 @@
           <a:p>
             <a:fld id="{3132CF77-6ABA-874C-80E0-4F20B077B08D}" type="datetimeFigureOut">
               <a:rPr lang="en-CA" smtClean="0"/>
-              <a:t>2025-07-15</a:t>
+              <a:t>2025-07-25</a:t>
             </a:fld>
             <a:endParaRPr lang="en-CA"/>
           </a:p>
@@ -1854,7 +1854,7 @@
           <a:p>
             <a:fld id="{3132CF77-6ABA-874C-80E0-4F20B077B08D}" type="datetimeFigureOut">
               <a:rPr lang="en-CA" smtClean="0"/>
-              <a:t>2025-07-15</a:t>
+              <a:t>2025-07-25</a:t>
             </a:fld>
             <a:endParaRPr lang="en-CA"/>
           </a:p>
@@ -2269,7 +2269,7 @@
           <a:p>
             <a:fld id="{3132CF77-6ABA-874C-80E0-4F20B077B08D}" type="datetimeFigureOut">
               <a:rPr lang="en-CA" smtClean="0"/>
-              <a:t>2025-07-15</a:t>
+              <a:t>2025-07-25</a:t>
             </a:fld>
             <a:endParaRPr lang="en-CA"/>
           </a:p>
@@ -2411,7 +2411,7 @@
           <a:p>
             <a:fld id="{3132CF77-6ABA-874C-80E0-4F20B077B08D}" type="datetimeFigureOut">
               <a:rPr lang="en-CA" smtClean="0"/>
-              <a:t>2025-07-15</a:t>
+              <a:t>2025-07-25</a:t>
             </a:fld>
             <a:endParaRPr lang="en-CA"/>
           </a:p>
@@ -2524,7 +2524,7 @@
           <a:p>
             <a:fld id="{3132CF77-6ABA-874C-80E0-4F20B077B08D}" type="datetimeFigureOut">
               <a:rPr lang="en-CA" smtClean="0"/>
-              <a:t>2025-07-15</a:t>
+              <a:t>2025-07-25</a:t>
             </a:fld>
             <a:endParaRPr lang="en-CA"/>
           </a:p>
@@ -2837,7 +2837,7 @@
           <a:p>
             <a:fld id="{3132CF77-6ABA-874C-80E0-4F20B077B08D}" type="datetimeFigureOut">
               <a:rPr lang="en-CA" smtClean="0"/>
-              <a:t>2025-07-15</a:t>
+              <a:t>2025-07-25</a:t>
             </a:fld>
             <a:endParaRPr lang="en-CA"/>
           </a:p>
@@ -3126,7 +3126,7 @@
           <a:p>
             <a:fld id="{3132CF77-6ABA-874C-80E0-4F20B077B08D}" type="datetimeFigureOut">
               <a:rPr lang="en-CA" smtClean="0"/>
-              <a:t>2025-07-15</a:t>
+              <a:t>2025-07-25</a:t>
             </a:fld>
             <a:endParaRPr lang="en-CA"/>
           </a:p>
@@ -3369,7 +3369,7 @@
           <a:p>
             <a:fld id="{3132CF77-6ABA-874C-80E0-4F20B077B08D}" type="datetimeFigureOut">
               <a:rPr lang="en-CA" smtClean="0"/>
-              <a:t>2025-07-15</a:t>
+              <a:t>2025-07-25</a:t>
             </a:fld>
             <a:endParaRPr lang="en-CA"/>
           </a:p>
@@ -6252,8 +6252,8 @@
         </p:nvSpPr>
         <p:spPr>
           <a:xfrm>
-            <a:off x="7488187" y="4144322"/>
-            <a:ext cx="4213654" cy="646331"/>
+            <a:off x="7135535" y="4421321"/>
+            <a:ext cx="4755738" cy="369332"/>
           </a:xfrm>
           <a:prstGeom prst="rect">
             <a:avLst/>
@@ -6281,7 +6281,7 @@
             </a:r>
             <a:r>
               <a:rPr lang="en-CA" dirty="0" err="1"/>
-              <a:t>s’effond</a:t>
+              <a:t>s’effondre</a:t>
             </a:r>
             <a:r>
               <a:rPr lang="en-CA" dirty="0"/>
@@ -6297,7 +6297,7 @@
             </a:r>
             <a:r>
               <a:rPr lang="en-CA" dirty="0" err="1"/>
-              <a:t>ces</a:t>
+              <a:t>ses</a:t>
             </a:r>
             <a:r>
               <a:rPr lang="en-CA" dirty="0"/>
@@ -6307,18 +6307,7 @@
               <a:rPr lang="en-CA" dirty="0" err="1"/>
               <a:t>valeurs</a:t>
             </a:r>
-            <a:r>
-              <a:rPr lang="en-CA" dirty="0"/>
-              <a:t> et </a:t>
-            </a:r>
-            <a:r>
-              <a:rPr lang="en-CA" dirty="0" err="1"/>
-              <a:t>mesuré</a:t>
-            </a:r>
-            <a:r>
-              <a:rPr lang="en-CA" dirty="0"/>
-              <a:t> de façon projective</a:t>
-            </a:r>
+            <a:endParaRPr lang="en-CA" dirty="0"/>
           </a:p>
         </p:txBody>
       </p:sp>
@@ -8355,8 +8344,8 @@
           </a:fontRef>
         </p:style>
       </p:cxnSp>
-      <mc:AlternateContent xmlns:mc="http://schemas.openxmlformats.org/markup-compatibility/2006">
-        <mc:Choice xmlns:a14="http://schemas.microsoft.com/office/drawing/2010/main" Requires="a14">
+      <mc:AlternateContent xmlns:mc="http://schemas.openxmlformats.org/markup-compatibility/2006" xmlns:a14="http://schemas.microsoft.com/office/drawing/2010/main">
+        <mc:Choice Requires="a14">
           <p:sp>
             <p:nvSpPr>
               <p:cNvPr id="14" name="TextBox 13">
@@ -8532,7 +8521,7 @@
             </p:txBody>
           </p:sp>
         </mc:Choice>
-        <mc:Fallback>
+        <mc:Fallback xmlns="">
           <p:sp>
             <p:nvSpPr>
               <p:cNvPr id="14" name="TextBox 13">
@@ -9762,8 +9751,8 @@
           <a:effectLst/>
         </p:spPr>
       </p:pic>
-      <mc:AlternateContent xmlns:mc="http://schemas.openxmlformats.org/markup-compatibility/2006">
-        <mc:Choice xmlns:a14="http://schemas.microsoft.com/office/drawing/2010/main" Requires="a14">
+      <mc:AlternateContent xmlns:mc="http://schemas.openxmlformats.org/markup-compatibility/2006" xmlns:a14="http://schemas.microsoft.com/office/drawing/2010/main">
+        <mc:Choice Requires="a14">
           <p:sp>
             <p:nvSpPr>
               <p:cNvPr id="3" name="TextBox 2">
@@ -9792,7 +9781,6 @@
               </a:bodyPr>
               <a:lstStyle/>
               <a:p>
-                <a:pPr/>
                 <a14:m>
                   <m:oMath xmlns:m="http://schemas.openxmlformats.org/officeDocument/2006/math">
                     <m:d>
@@ -9931,7 +9919,7 @@
             </p:txBody>
           </p:sp>
         </mc:Choice>
-        <mc:Fallback>
+        <mc:Fallback xmlns="">
           <p:sp>
             <p:nvSpPr>
               <p:cNvPr id="3" name="TextBox 2">
@@ -10011,8 +9999,8 @@
           </a:prstGeom>
         </p:spPr>
       </p:pic>
-      <mc:AlternateContent xmlns:mc="http://schemas.openxmlformats.org/markup-compatibility/2006">
-        <mc:Choice xmlns:a14="http://schemas.microsoft.com/office/drawing/2010/main" Requires="a14">
+      <mc:AlternateContent xmlns:mc="http://schemas.openxmlformats.org/markup-compatibility/2006" xmlns:a14="http://schemas.microsoft.com/office/drawing/2010/main">
+        <mc:Choice Requires="a14">
           <p:sp>
             <p:nvSpPr>
               <p:cNvPr id="6" name="TextBox 5">
@@ -10112,7 +10100,7 @@
             </p:txBody>
           </p:sp>
         </mc:Choice>
-        <mc:Fallback>
+        <mc:Fallback xmlns="">
           <p:sp>
             <p:nvSpPr>
               <p:cNvPr id="6" name="TextBox 5">

</xml_diff>

<commit_message>
Fixes in chapter 1 and 2
</commit_message>
<xml_diff>
--- a/figure/FIGURES.pptx
+++ b/figure/FIGURES.pptx
@@ -199,7 +199,7 @@
           <a:p>
             <a:fld id="{25E4B823-9091-594F-87B2-4D821D50F95B}" type="datetimeFigureOut">
               <a:rPr lang="en-CA" smtClean="0"/>
-              <a:t>2025-07-25</a:t>
+              <a:t>2025-08-08</a:t>
             </a:fld>
             <a:endParaRPr lang="en-CA"/>
           </a:p>
@@ -700,7 +700,7 @@
           <a:p>
             <a:fld id="{3132CF77-6ABA-874C-80E0-4F20B077B08D}" type="datetimeFigureOut">
               <a:rPr lang="en-CA" smtClean="0"/>
-              <a:t>2025-07-25</a:t>
+              <a:t>2025-08-08</a:t>
             </a:fld>
             <a:endParaRPr lang="en-CA"/>
           </a:p>
@@ -900,7 +900,7 @@
           <a:p>
             <a:fld id="{3132CF77-6ABA-874C-80E0-4F20B077B08D}" type="datetimeFigureOut">
               <a:rPr lang="en-CA" smtClean="0"/>
-              <a:t>2025-07-25</a:t>
+              <a:t>2025-08-08</a:t>
             </a:fld>
             <a:endParaRPr lang="en-CA"/>
           </a:p>
@@ -1110,7 +1110,7 @@
           <a:p>
             <a:fld id="{3132CF77-6ABA-874C-80E0-4F20B077B08D}" type="datetimeFigureOut">
               <a:rPr lang="en-CA" smtClean="0"/>
-              <a:t>2025-07-25</a:t>
+              <a:t>2025-08-08</a:t>
             </a:fld>
             <a:endParaRPr lang="en-CA"/>
           </a:p>
@@ -1310,7 +1310,7 @@
           <a:p>
             <a:fld id="{3132CF77-6ABA-874C-80E0-4F20B077B08D}" type="datetimeFigureOut">
               <a:rPr lang="en-CA" smtClean="0"/>
-              <a:t>2025-07-25</a:t>
+              <a:t>2025-08-08</a:t>
             </a:fld>
             <a:endParaRPr lang="en-CA"/>
           </a:p>
@@ -1586,7 +1586,7 @@
           <a:p>
             <a:fld id="{3132CF77-6ABA-874C-80E0-4F20B077B08D}" type="datetimeFigureOut">
               <a:rPr lang="en-CA" smtClean="0"/>
-              <a:t>2025-07-25</a:t>
+              <a:t>2025-08-08</a:t>
             </a:fld>
             <a:endParaRPr lang="en-CA"/>
           </a:p>
@@ -1854,7 +1854,7 @@
           <a:p>
             <a:fld id="{3132CF77-6ABA-874C-80E0-4F20B077B08D}" type="datetimeFigureOut">
               <a:rPr lang="en-CA" smtClean="0"/>
-              <a:t>2025-07-25</a:t>
+              <a:t>2025-08-08</a:t>
             </a:fld>
             <a:endParaRPr lang="en-CA"/>
           </a:p>
@@ -2269,7 +2269,7 @@
           <a:p>
             <a:fld id="{3132CF77-6ABA-874C-80E0-4F20B077B08D}" type="datetimeFigureOut">
               <a:rPr lang="en-CA" smtClean="0"/>
-              <a:t>2025-07-25</a:t>
+              <a:t>2025-08-08</a:t>
             </a:fld>
             <a:endParaRPr lang="en-CA"/>
           </a:p>
@@ -2411,7 +2411,7 @@
           <a:p>
             <a:fld id="{3132CF77-6ABA-874C-80E0-4F20B077B08D}" type="datetimeFigureOut">
               <a:rPr lang="en-CA" smtClean="0"/>
-              <a:t>2025-07-25</a:t>
+              <a:t>2025-08-08</a:t>
             </a:fld>
             <a:endParaRPr lang="en-CA"/>
           </a:p>
@@ -2524,7 +2524,7 @@
           <a:p>
             <a:fld id="{3132CF77-6ABA-874C-80E0-4F20B077B08D}" type="datetimeFigureOut">
               <a:rPr lang="en-CA" smtClean="0"/>
-              <a:t>2025-07-25</a:t>
+              <a:t>2025-08-08</a:t>
             </a:fld>
             <a:endParaRPr lang="en-CA"/>
           </a:p>
@@ -2837,7 +2837,7 @@
           <a:p>
             <a:fld id="{3132CF77-6ABA-874C-80E0-4F20B077B08D}" type="datetimeFigureOut">
               <a:rPr lang="en-CA" smtClean="0"/>
-              <a:t>2025-07-25</a:t>
+              <a:t>2025-08-08</a:t>
             </a:fld>
             <a:endParaRPr lang="en-CA"/>
           </a:p>
@@ -3126,7 +3126,7 @@
           <a:p>
             <a:fld id="{3132CF77-6ABA-874C-80E0-4F20B077B08D}" type="datetimeFigureOut">
               <a:rPr lang="en-CA" smtClean="0"/>
-              <a:t>2025-07-25</a:t>
+              <a:t>2025-08-08</a:t>
             </a:fld>
             <a:endParaRPr lang="en-CA"/>
           </a:p>
@@ -3369,7 +3369,7 @@
           <a:p>
             <a:fld id="{3132CF77-6ABA-874C-80E0-4F20B077B08D}" type="datetimeFigureOut">
               <a:rPr lang="en-CA" smtClean="0"/>
-              <a:t>2025-07-25</a:t>
+              <a:t>2025-08-08</a:t>
             </a:fld>
             <a:endParaRPr lang="en-CA"/>
           </a:p>
@@ -7796,8 +7796,8 @@
           </p:sp>
         </mc:Fallback>
       </mc:AlternateContent>
-      <mc:AlternateContent xmlns:mc="http://schemas.openxmlformats.org/markup-compatibility/2006" xmlns:a14="http://schemas.microsoft.com/office/drawing/2010/main">
-        <mc:Choice Requires="a14">
+      <mc:AlternateContent xmlns:mc="http://schemas.openxmlformats.org/markup-compatibility/2006">
+        <mc:Choice xmlns:a14="http://schemas.microsoft.com/office/drawing/2010/main" Requires="a14">
           <p:sp>
             <p:nvSpPr>
               <p:cNvPr id="26" name="TextBox 25">
@@ -7812,8 +7812,8 @@
             </p:nvSpPr>
             <p:spPr>
               <a:xfrm>
-                <a:off x="10677996" y="1606378"/>
-                <a:ext cx="1514004" cy="276999"/>
+                <a:off x="10459732" y="1580659"/>
+                <a:ext cx="1642244" cy="276999"/>
               </a:xfrm>
               <a:prstGeom prst="rect">
                 <a:avLst/>
@@ -7865,7 +7865,7 @@
                                 <a:rPr lang="en-CA" b="0" i="1" smtClean="0">
                                   <a:latin typeface="Cambria Math" panose="02040503050406030204" pitchFamily="18" charset="0"/>
                                 </a:rPr>
-                                <m:t>=90 </m:t>
+                                <m:t>=378 </m:t>
                               </m:r>
                               <m:r>
                                 <a:rPr lang="en-CA" b="0" i="1" smtClean="0">
@@ -7897,7 +7897,7 @@
             </p:txBody>
           </p:sp>
         </mc:Choice>
-        <mc:Fallback xmlns="">
+        <mc:Fallback>
           <p:sp>
             <p:nvSpPr>
               <p:cNvPr id="26" name="TextBox 25">
@@ -7914,8 +7914,8 @@
             </p:nvSpPr>
             <p:spPr>
               <a:xfrm>
-                <a:off x="10677996" y="1606378"/>
-                <a:ext cx="1514004" cy="276999"/>
+                <a:off x="10459732" y="1580659"/>
+                <a:ext cx="1642244" cy="276999"/>
               </a:xfrm>
               <a:prstGeom prst="rect">
                 <a:avLst/>
@@ -7923,7 +7923,7 @@
               <a:blipFill>
                 <a:blip r:embed="rId10"/>
                 <a:stretch>
-                  <a:fillRect l="-24793" t="-160870" r="-19008" b="-234783"/>
+                  <a:fillRect l="-23077" t="-160870" r="-18462" b="-234783"/>
                 </a:stretch>
               </a:blipFill>
             </p:spPr>
@@ -7956,7 +7956,7 @@
         </p:nvSpPr>
         <p:spPr>
           <a:xfrm>
-            <a:off x="346535" y="3958281"/>
+            <a:off x="887510" y="3977331"/>
             <a:ext cx="1853514" cy="369332"/>
           </a:xfrm>
           <a:prstGeom prst="rect">
@@ -7973,14 +7973,6 @@
             <a:r>
               <a:rPr lang="en-CA" dirty="0" err="1"/>
               <a:t>Couplage</a:t>
-            </a:r>
-            <a:r>
-              <a:rPr lang="en-CA" dirty="0"/>
-              <a:t> </a:t>
-            </a:r>
-            <a:r>
-              <a:rPr lang="en-CA" dirty="0" err="1"/>
-              <a:t>faible</a:t>
             </a:r>
             <a:endParaRPr lang="en-CA" dirty="0"/>
           </a:p>

</xml_diff>